<commit_message>
Update readme, update presentation
</commit_message>
<xml_diff>
--- a/Presentation/Final Project Presentation.pptx
+++ b/Presentation/Final Project Presentation.pptx
@@ -5,7 +5,7 @@
     <p:sldMasterId id="2147483659" r:id="rId1"/>
   </p:sldMasterIdLst>
   <p:notesMasterIdLst>
-    <p:notesMasterId r:id="rId19"/>
+    <p:notesMasterId r:id="rId17"/>
   </p:notesMasterIdLst>
   <p:sldIdLst>
     <p:sldId id="256" r:id="rId2"/>
@@ -19,27 +19,25 @@
     <p:sldId id="271" r:id="rId10"/>
     <p:sldId id="269" r:id="rId11"/>
     <p:sldId id="260" r:id="rId12"/>
-    <p:sldId id="270" r:id="rId13"/>
-    <p:sldId id="261" r:id="rId14"/>
-    <p:sldId id="273" r:id="rId15"/>
-    <p:sldId id="262" r:id="rId16"/>
-    <p:sldId id="263" r:id="rId17"/>
-    <p:sldId id="264" r:id="rId18"/>
+    <p:sldId id="261" r:id="rId13"/>
+    <p:sldId id="273" r:id="rId14"/>
+    <p:sldId id="263" r:id="rId15"/>
+    <p:sldId id="264" r:id="rId16"/>
   </p:sldIdLst>
   <p:sldSz cx="9144000" cy="5143500" type="screen16x9"/>
   <p:notesSz cx="6858000" cy="9144000"/>
   <p:embeddedFontLst>
     <p:embeddedFont>
       <p:font typeface="Maven Pro" panose="020B0604020202020204" charset="0"/>
-      <p:regular r:id="rId20"/>
-      <p:bold r:id="rId21"/>
+      <p:regular r:id="rId18"/>
+      <p:bold r:id="rId19"/>
     </p:embeddedFont>
     <p:embeddedFont>
       <p:font typeface="Nunito" pitchFamily="2" charset="0"/>
-      <p:regular r:id="rId22"/>
-      <p:bold r:id="rId23"/>
-      <p:italic r:id="rId24"/>
-      <p:boldItalic r:id="rId25"/>
+      <p:regular r:id="rId20"/>
+      <p:bold r:id="rId21"/>
+      <p:italic r:id="rId22"/>
+      <p:boldItalic r:id="rId23"/>
     </p:embeddedFont>
   </p:embeddedFontLst>
   <p:defaultTextStyle>
@@ -840,115 +838,6 @@
   <p:cSld>
     <p:spTree>
       <p:nvGrpSpPr>
-        <p:cNvPr id="1" name="Shape 297"/>
-        <p:cNvGrpSpPr/>
-        <p:nvPr/>
-      </p:nvGrpSpPr>
-      <p:grpSpPr>
-        <a:xfrm>
-          <a:off x="0" y="0"/>
-          <a:ext cx="0" cy="0"/>
-          <a:chOff x="0" y="0"/>
-          <a:chExt cx="0" cy="0"/>
-        </a:xfrm>
-      </p:grpSpPr>
-      <p:sp>
-        <p:nvSpPr>
-          <p:cNvPr id="298" name="Google Shape;298;g12a981a8416_0_329:notes"/>
-          <p:cNvSpPr>
-            <a:spLocks noGrp="1" noRot="1" noChangeAspect="1"/>
-          </p:cNvSpPr>
-          <p:nvPr>
-            <p:ph type="sldImg" idx="2"/>
-          </p:nvPr>
-        </p:nvSpPr>
-        <p:spPr>
-          <a:xfrm>
-            <a:off x="381000" y="685800"/>
-            <a:ext cx="6096000" cy="3429000"/>
-          </a:xfrm>
-          <a:custGeom>
-            <a:avLst/>
-            <a:gdLst/>
-            <a:ahLst/>
-            <a:cxnLst/>
-            <a:rect l="l" t="t" r="r" b="b"/>
-            <a:pathLst>
-              <a:path w="120000" h="120000" extrusionOk="0">
-                <a:moveTo>
-                  <a:pt x="0" y="0"/>
-                </a:moveTo>
-                <a:lnTo>
-                  <a:pt x="120000" y="0"/>
-                </a:lnTo>
-                <a:lnTo>
-                  <a:pt x="120000" y="120000"/>
-                </a:lnTo>
-                <a:lnTo>
-                  <a:pt x="0" y="120000"/>
-                </a:lnTo>
-                <a:close/>
-              </a:path>
-            </a:pathLst>
-          </a:custGeom>
-        </p:spPr>
-      </p:sp>
-      <p:sp>
-        <p:nvSpPr>
-          <p:cNvPr id="299" name="Google Shape;299;g12a981a8416_0_329:notes"/>
-          <p:cNvSpPr txBox="1">
-            <a:spLocks noGrp="1"/>
-          </p:cNvSpPr>
-          <p:nvPr>
-            <p:ph type="body" idx="1"/>
-          </p:nvPr>
-        </p:nvSpPr>
-        <p:spPr>
-          <a:xfrm>
-            <a:off x="685800" y="4343400"/>
-            <a:ext cx="5486400" cy="4114800"/>
-          </a:xfrm>
-          <a:prstGeom prst="rect">
-            <a:avLst/>
-          </a:prstGeom>
-        </p:spPr>
-        <p:txBody>
-          <a:bodyPr spcFirstLastPara="1" wrap="square" lIns="91425" tIns="91425" rIns="91425" bIns="91425" anchor="t" anchorCtr="0">
-            <a:noAutofit/>
-          </a:bodyPr>
-          <a:lstStyle/>
-          <a:p>
-            <a:pPr marL="0" lvl="0" indent="0" algn="l" rtl="0">
-              <a:spcBef>
-                <a:spcPts val="0"/>
-              </a:spcBef>
-              <a:spcAft>
-                <a:spcPts val="0"/>
-              </a:spcAft>
-              <a:buNone/>
-            </a:pPr>
-            <a:endParaRPr/>
-          </a:p>
-        </p:txBody>
-      </p:sp>
-    </p:spTree>
-    <p:extLst>
-      <p:ext uri="{BB962C8B-B14F-4D97-AF65-F5344CB8AC3E}">
-        <p14:creationId xmlns:p14="http://schemas.microsoft.com/office/powerpoint/2010/main" val="424320488"/>
-      </p:ext>
-    </p:extLst>
-  </p:cSld>
-  <p:clrMapOvr>
-    <a:masterClrMapping/>
-  </p:clrMapOvr>
-</p:notes>
-</file>
-
-<file path=ppt/notesSlides/notesSlide11.xml><?xml version="1.0" encoding="utf-8"?>
-<p:notes xmlns:a="http://schemas.openxmlformats.org/drawingml/2006/main" xmlns:r="http://schemas.openxmlformats.org/officeDocument/2006/relationships" xmlns:p="http://schemas.openxmlformats.org/presentationml/2006/main" showMasterSp="0" showMasterPhAnim="0">
-  <p:cSld>
-    <p:spTree>
-      <p:nvGrpSpPr>
         <p:cNvPr id="1" name="Shape 303"/>
         <p:cNvGrpSpPr/>
         <p:nvPr/>
@@ -1027,6 +916,318 @@
           </a:bodyPr>
           <a:lstStyle/>
           <a:p>
+            <a:pPr marR="0" algn="l" rtl="0" fontAlgn="t">
+              <a:spcBef>
+                <a:spcPts val="0"/>
+              </a:spcBef>
+              <a:spcAft>
+                <a:spcPts val="0"/>
+              </a:spcAft>
+            </a:pPr>
+            <a:r>
+              <a:rPr lang="en-US" sz="1800" b="1" i="0" u="none" strike="noStrike" dirty="0">
+                <a:solidFill>
+                  <a:srgbClr val="FFFFFF"/>
+                </a:solidFill>
+                <a:effectLst/>
+                <a:latin typeface="Arial" panose="020B0604020202020204" pitchFamily="34" charset="0"/>
+              </a:rPr>
+              <a:t>Model</a:t>
+            </a:r>
+            <a:endParaRPr lang="en-US" sz="1800" b="0" i="0" u="none" strike="noStrike" dirty="0">
+              <a:effectLst/>
+              <a:latin typeface="Arial" panose="020B0604020202020204" pitchFamily="34" charset="0"/>
+            </a:endParaRPr>
+          </a:p>
+          <a:p>
+            <a:pPr marR="0" algn="l" rtl="0" fontAlgn="t">
+              <a:spcBef>
+                <a:spcPts val="0"/>
+              </a:spcBef>
+              <a:spcAft>
+                <a:spcPts val="0"/>
+              </a:spcAft>
+            </a:pPr>
+            <a:r>
+              <a:rPr lang="en-US" sz="1800" b="1" i="0" u="none" strike="noStrike" dirty="0">
+                <a:solidFill>
+                  <a:srgbClr val="FFFFFF"/>
+                </a:solidFill>
+                <a:effectLst/>
+                <a:latin typeface="Arial" panose="020B0604020202020204" pitchFamily="34" charset="0"/>
+              </a:rPr>
+              <a:t>Accuracy Score</a:t>
+            </a:r>
+            <a:endParaRPr lang="en-US" sz="1800" b="0" i="0" u="none" strike="noStrike" dirty="0">
+              <a:effectLst/>
+              <a:latin typeface="Arial" panose="020B0604020202020204" pitchFamily="34" charset="0"/>
+            </a:endParaRPr>
+          </a:p>
+          <a:p>
+            <a:pPr marR="0" algn="l" rtl="0" fontAlgn="t">
+              <a:spcBef>
+                <a:spcPts val="0"/>
+              </a:spcBef>
+              <a:spcAft>
+                <a:spcPts val="0"/>
+              </a:spcAft>
+            </a:pPr>
+            <a:r>
+              <a:rPr lang="en-US" sz="1800" b="0" i="0" u="none" strike="noStrike" dirty="0">
+                <a:solidFill>
+                  <a:srgbClr val="424242"/>
+                </a:solidFill>
+                <a:effectLst/>
+                <a:latin typeface="Arial" panose="020B0604020202020204" pitchFamily="34" charset="0"/>
+              </a:rPr>
+              <a:t>Logistic Regression</a:t>
+            </a:r>
+            <a:endParaRPr lang="en-US" sz="1800" b="0" i="0" u="none" strike="noStrike" dirty="0">
+              <a:effectLst/>
+              <a:latin typeface="Arial" panose="020B0604020202020204" pitchFamily="34" charset="0"/>
+            </a:endParaRPr>
+          </a:p>
+          <a:p>
+            <a:pPr marL="0" marR="0" indent="0" algn="l" rtl="0" eaLnBrk="1" fontAlgn="auto" latinLnBrk="0" hangingPunct="1">
+              <a:spcBef>
+                <a:spcPts val="0"/>
+              </a:spcBef>
+              <a:spcAft>
+                <a:spcPts val="0"/>
+              </a:spcAft>
+            </a:pPr>
+            <a:r>
+              <a:rPr lang="en-US" sz="1800" b="0" i="0" u="none" strike="noStrike" dirty="0">
+                <a:solidFill>
+                  <a:srgbClr val="424242"/>
+                </a:solidFill>
+                <a:effectLst/>
+                <a:latin typeface="Arial" panose="020B0604020202020204" pitchFamily="34" charset="0"/>
+              </a:rPr>
+              <a:t>87.228%</a:t>
+            </a:r>
+            <a:endParaRPr lang="en-US" sz="1800" b="0" i="0" u="none" strike="noStrike" dirty="0">
+              <a:effectLst/>
+              <a:latin typeface="Arial" panose="020B0604020202020204" pitchFamily="34" charset="0"/>
+            </a:endParaRPr>
+          </a:p>
+          <a:p>
+            <a:pPr marL="0" marR="0" indent="0" algn="l" rtl="0" eaLnBrk="1" fontAlgn="auto" latinLnBrk="0" hangingPunct="1">
+              <a:lnSpc>
+                <a:spcPct val="115000"/>
+              </a:lnSpc>
+              <a:spcBef>
+                <a:spcPts val="0"/>
+              </a:spcBef>
+              <a:spcAft>
+                <a:spcPts val="1200"/>
+              </a:spcAft>
+            </a:pPr>
+            <a:r>
+              <a:rPr lang="en-US" sz="1800" b="0" i="0" u="none" strike="noStrike" spc="0" baseline="0" dirty="0">
+                <a:ln>
+                  <a:noFill/>
+                </a:ln>
+                <a:solidFill>
+                  <a:srgbClr val="424242"/>
+                </a:solidFill>
+                <a:effectLst/>
+                <a:latin typeface="Arial" panose="020B0604020202020204" pitchFamily="34" charset="0"/>
+              </a:rPr>
+              <a:t>Random Forest Classifier</a:t>
+            </a:r>
+            <a:endParaRPr lang="en-US" sz="1800" b="0" i="0" u="none" strike="noStrike" dirty="0">
+              <a:effectLst/>
+              <a:latin typeface="Arial" panose="020B0604020202020204" pitchFamily="34" charset="0"/>
+            </a:endParaRPr>
+          </a:p>
+          <a:p>
+            <a:pPr marR="0" algn="l" rtl="0" fontAlgn="t">
+              <a:spcBef>
+                <a:spcPts val="0"/>
+              </a:spcBef>
+              <a:spcAft>
+                <a:spcPts val="0"/>
+              </a:spcAft>
+            </a:pPr>
+            <a:r>
+              <a:rPr lang="en-US" sz="1800" b="0" i="0" u="none" strike="noStrike" dirty="0">
+                <a:solidFill>
+                  <a:srgbClr val="424242"/>
+                </a:solidFill>
+                <a:effectLst/>
+                <a:latin typeface="Arial" panose="020B0604020202020204" pitchFamily="34" charset="0"/>
+              </a:rPr>
+              <a:t>87.772%</a:t>
+            </a:r>
+            <a:endParaRPr lang="en-US" sz="1800" b="0" i="0" u="none" strike="noStrike" dirty="0">
+              <a:effectLst/>
+              <a:latin typeface="Arial" panose="020B0604020202020204" pitchFamily="34" charset="0"/>
+            </a:endParaRPr>
+          </a:p>
+          <a:p>
+            <a:pPr marL="0" marR="0" indent="0" algn="l" rtl="0" eaLnBrk="1" fontAlgn="auto" latinLnBrk="0" hangingPunct="1">
+              <a:lnSpc>
+                <a:spcPct val="115000"/>
+              </a:lnSpc>
+              <a:spcBef>
+                <a:spcPts val="0"/>
+              </a:spcBef>
+              <a:spcAft>
+                <a:spcPts val="1200"/>
+              </a:spcAft>
+            </a:pPr>
+            <a:r>
+              <a:rPr lang="en-US" sz="1800" b="0" i="0" u="none" strike="noStrike" spc="0" baseline="0" dirty="0">
+                <a:ln>
+                  <a:noFill/>
+                </a:ln>
+                <a:solidFill>
+                  <a:srgbClr val="424242"/>
+                </a:solidFill>
+                <a:effectLst/>
+                <a:latin typeface="Arial" panose="020B0604020202020204" pitchFamily="34" charset="0"/>
+              </a:rPr>
+              <a:t>Support Vector Machine</a:t>
+            </a:r>
+            <a:endParaRPr lang="en-US" sz="1800" b="0" i="0" u="none" strike="noStrike" dirty="0">
+              <a:effectLst/>
+              <a:latin typeface="Arial" panose="020B0604020202020204" pitchFamily="34" charset="0"/>
+            </a:endParaRPr>
+          </a:p>
+          <a:p>
+            <a:pPr marR="0" algn="l" rtl="0" fontAlgn="t">
+              <a:spcBef>
+                <a:spcPts val="0"/>
+              </a:spcBef>
+              <a:spcAft>
+                <a:spcPts val="0"/>
+              </a:spcAft>
+            </a:pPr>
+            <a:r>
+              <a:rPr lang="en-US" sz="1800" b="0" i="0" u="none" strike="noStrike" dirty="0">
+                <a:solidFill>
+                  <a:srgbClr val="424242"/>
+                </a:solidFill>
+                <a:effectLst/>
+                <a:latin typeface="Arial" panose="020B0604020202020204" pitchFamily="34" charset="0"/>
+              </a:rPr>
+              <a:t>87.228%</a:t>
+            </a:r>
+            <a:endParaRPr lang="en-US" sz="1800" b="0" i="0" u="none" strike="noStrike" dirty="0">
+              <a:effectLst/>
+              <a:latin typeface="Arial" panose="020B0604020202020204" pitchFamily="34" charset="0"/>
+            </a:endParaRPr>
+          </a:p>
+          <a:p>
+            <a:pPr marL="0" marR="0" indent="0" algn="l" rtl="0" eaLnBrk="1" fontAlgn="auto" latinLnBrk="0" hangingPunct="1">
+              <a:lnSpc>
+                <a:spcPct val="115000"/>
+              </a:lnSpc>
+              <a:spcBef>
+                <a:spcPts val="0"/>
+              </a:spcBef>
+              <a:spcAft>
+                <a:spcPts val="1200"/>
+              </a:spcAft>
+            </a:pPr>
+            <a:r>
+              <a:rPr lang="en-US" sz="1800" b="0" i="0" u="none" strike="noStrike" spc="0" baseline="0" dirty="0">
+                <a:ln>
+                  <a:noFill/>
+                </a:ln>
+                <a:solidFill>
+                  <a:srgbClr val="424242"/>
+                </a:solidFill>
+                <a:effectLst/>
+                <a:latin typeface="Arial" panose="020B0604020202020204" pitchFamily="34" charset="0"/>
+              </a:rPr>
+              <a:t>XG Boost</a:t>
+            </a:r>
+            <a:endParaRPr lang="en-US" sz="1800" b="0" i="0" u="none" strike="noStrike" dirty="0">
+              <a:effectLst/>
+              <a:latin typeface="Arial" panose="020B0604020202020204" pitchFamily="34" charset="0"/>
+            </a:endParaRPr>
+          </a:p>
+          <a:p>
+            <a:pPr marR="0" algn="l" rtl="0" fontAlgn="t">
+              <a:spcBef>
+                <a:spcPts val="0"/>
+              </a:spcBef>
+              <a:spcAft>
+                <a:spcPts val="0"/>
+              </a:spcAft>
+            </a:pPr>
+            <a:r>
+              <a:rPr lang="en-US" sz="1800" b="0" i="0" u="none" strike="noStrike" dirty="0">
+                <a:solidFill>
+                  <a:srgbClr val="424242"/>
+                </a:solidFill>
+                <a:effectLst/>
+                <a:latin typeface="Arial" panose="020B0604020202020204" pitchFamily="34" charset="0"/>
+              </a:rPr>
+              <a:t>88.315%</a:t>
+            </a:r>
+            <a:endParaRPr lang="en-US" sz="1800" b="0" i="0" u="none" strike="noStrike" dirty="0">
+              <a:effectLst/>
+              <a:latin typeface="Arial" panose="020B0604020202020204" pitchFamily="34" charset="0"/>
+            </a:endParaRPr>
+          </a:p>
+          <a:p>
+            <a:pPr marL="0" marR="0" indent="0" algn="l" rtl="0" eaLnBrk="1" fontAlgn="auto" latinLnBrk="0" hangingPunct="1">
+              <a:lnSpc>
+                <a:spcPct val="115000"/>
+              </a:lnSpc>
+              <a:spcBef>
+                <a:spcPts val="0"/>
+              </a:spcBef>
+              <a:spcAft>
+                <a:spcPts val="1200"/>
+              </a:spcAft>
+            </a:pPr>
+            <a:r>
+              <a:rPr lang="en-US" sz="1800" b="0" i="0" u="none" strike="noStrike" spc="0" baseline="0" dirty="0">
+                <a:ln>
+                  <a:noFill/>
+                </a:ln>
+                <a:solidFill>
+                  <a:srgbClr val="424242"/>
+                </a:solidFill>
+                <a:effectLst/>
+                <a:latin typeface="Arial" panose="020B0604020202020204" pitchFamily="34" charset="0"/>
+              </a:rPr>
+              <a:t>Naïve Bayes</a:t>
+            </a:r>
+            <a:endParaRPr lang="en-US" sz="1800" b="0" i="0" u="none" strike="noStrike" dirty="0">
+              <a:effectLst/>
+              <a:latin typeface="Arial" panose="020B0604020202020204" pitchFamily="34" charset="0"/>
+            </a:endParaRPr>
+          </a:p>
+          <a:p>
+            <a:pPr marR="0" algn="l" rtl="0" fontAlgn="t">
+              <a:spcBef>
+                <a:spcPts val="0"/>
+              </a:spcBef>
+              <a:spcAft>
+                <a:spcPts val="0"/>
+              </a:spcAft>
+            </a:pPr>
+            <a:r>
+              <a:rPr lang="en-US" sz="1800" b="0" i="0" u="none" strike="noStrike" dirty="0">
+                <a:solidFill>
+                  <a:srgbClr val="424242"/>
+                </a:solidFill>
+                <a:effectLst/>
+                <a:latin typeface="Arial" panose="020B0604020202020204" pitchFamily="34" charset="0"/>
+              </a:rPr>
+              <a:t>71.467%</a:t>
+            </a:r>
+            <a:endParaRPr lang="en-US" sz="1800" b="0" i="0" u="none" strike="noStrike" dirty="0">
+              <a:effectLst/>
+              <a:latin typeface="Arial" panose="020B0604020202020204" pitchFamily="34" charset="0"/>
+            </a:endParaRPr>
+          </a:p>
+          <a:p>
             <a:pPr marL="0" lvl="0" indent="0" algn="l" rtl="0">
               <a:spcBef>
                 <a:spcPts val="0"/>
@@ -1036,7 +1237,7 @@
               </a:spcAft>
               <a:buNone/>
             </a:pPr>
-            <a:endParaRPr/>
+            <a:endParaRPr dirty="0"/>
           </a:p>
         </p:txBody>
       </p:sp>
@@ -1048,111 +1249,7 @@
 </p:notes>
 </file>
 
-<file path=ppt/notesSlides/notesSlide12.xml><?xml version="1.0" encoding="utf-8"?>
-<p:notes xmlns:a="http://schemas.openxmlformats.org/drawingml/2006/main" xmlns:r="http://schemas.openxmlformats.org/officeDocument/2006/relationships" xmlns:p="http://schemas.openxmlformats.org/presentationml/2006/main" showMasterSp="0" showMasterPhAnim="0">
-  <p:cSld>
-    <p:spTree>
-      <p:nvGrpSpPr>
-        <p:cNvPr id="1" name="Shape 309"/>
-        <p:cNvGrpSpPr/>
-        <p:nvPr/>
-      </p:nvGrpSpPr>
-      <p:grpSpPr>
-        <a:xfrm>
-          <a:off x="0" y="0"/>
-          <a:ext cx="0" cy="0"/>
-          <a:chOff x="0" y="0"/>
-          <a:chExt cx="0" cy="0"/>
-        </a:xfrm>
-      </p:grpSpPr>
-      <p:sp>
-        <p:nvSpPr>
-          <p:cNvPr id="310" name="Google Shape;310;g12a981a8416_0_339:notes"/>
-          <p:cNvSpPr>
-            <a:spLocks noGrp="1" noRot="1" noChangeAspect="1"/>
-          </p:cNvSpPr>
-          <p:nvPr>
-            <p:ph type="sldImg" idx="2"/>
-          </p:nvPr>
-        </p:nvSpPr>
-        <p:spPr>
-          <a:xfrm>
-            <a:off x="381300" y="685800"/>
-            <a:ext cx="6096000" cy="3429000"/>
-          </a:xfrm>
-          <a:custGeom>
-            <a:avLst/>
-            <a:gdLst/>
-            <a:ahLst/>
-            <a:cxnLst/>
-            <a:rect l="l" t="t" r="r" b="b"/>
-            <a:pathLst>
-              <a:path w="120000" h="120000" extrusionOk="0">
-                <a:moveTo>
-                  <a:pt x="0" y="0"/>
-                </a:moveTo>
-                <a:lnTo>
-                  <a:pt x="120000" y="0"/>
-                </a:lnTo>
-                <a:lnTo>
-                  <a:pt x="120000" y="120000"/>
-                </a:lnTo>
-                <a:lnTo>
-                  <a:pt x="0" y="120000"/>
-                </a:lnTo>
-                <a:close/>
-              </a:path>
-            </a:pathLst>
-          </a:custGeom>
-        </p:spPr>
-      </p:sp>
-      <p:sp>
-        <p:nvSpPr>
-          <p:cNvPr id="311" name="Google Shape;311;g12a981a8416_0_339:notes"/>
-          <p:cNvSpPr txBox="1">
-            <a:spLocks noGrp="1"/>
-          </p:cNvSpPr>
-          <p:nvPr>
-            <p:ph type="body" idx="1"/>
-          </p:nvPr>
-        </p:nvSpPr>
-        <p:spPr>
-          <a:xfrm>
-            <a:off x="685800" y="4343400"/>
-            <a:ext cx="5486400" cy="4114800"/>
-          </a:xfrm>
-          <a:prstGeom prst="rect">
-            <a:avLst/>
-          </a:prstGeom>
-        </p:spPr>
-        <p:txBody>
-          <a:bodyPr spcFirstLastPara="1" wrap="square" lIns="91425" tIns="91425" rIns="91425" bIns="91425" anchor="t" anchorCtr="0">
-            <a:noAutofit/>
-          </a:bodyPr>
-          <a:lstStyle/>
-          <a:p>
-            <a:pPr marL="0" lvl="0" indent="0" algn="l" rtl="0">
-              <a:spcBef>
-                <a:spcPts val="0"/>
-              </a:spcBef>
-              <a:spcAft>
-                <a:spcPts val="0"/>
-              </a:spcAft>
-              <a:buNone/>
-            </a:pPr>
-            <a:endParaRPr/>
-          </a:p>
-        </p:txBody>
-      </p:sp>
-    </p:spTree>
-  </p:cSld>
-  <p:clrMapOvr>
-    <a:masterClrMapping/>
-  </p:clrMapOvr>
-</p:notes>
-</file>
-
-<file path=ppt/notesSlides/notesSlide13.xml><?xml version="1.0" encoding="utf-8"?>
+<file path=ppt/notesSlides/notesSlide11.xml><?xml version="1.0" encoding="utf-8"?>
 <p:notes xmlns:a="http://schemas.openxmlformats.org/drawingml/2006/main" xmlns:r="http://schemas.openxmlformats.org/officeDocument/2006/relationships" xmlns:p="http://schemas.openxmlformats.org/presentationml/2006/main" showMasterSp="0" showMasterPhAnim="0">
   <p:cSld>
     <p:spTree>
@@ -1256,7 +1353,7 @@
 </p:notes>
 </file>
 
-<file path=ppt/notesSlides/notesSlide14.xml><?xml version="1.0" encoding="utf-8"?>
+<file path=ppt/notesSlides/notesSlide12.xml><?xml version="1.0" encoding="utf-8"?>
 <p:notes xmlns:a="http://schemas.openxmlformats.org/drawingml/2006/main" xmlns:r="http://schemas.openxmlformats.org/officeDocument/2006/relationships" xmlns:p="http://schemas.openxmlformats.org/presentationml/2006/main" showMasterSp="0" showMasterPhAnim="0">
   <p:cSld>
     <p:spTree>
@@ -16339,6 +16436,30 @@
             <a:endParaRPr lang="en-US" dirty="0"/>
           </a:p>
           <a:p>
+            <a:pPr marL="285750" indent="-285750">
+              <a:spcAft>
+                <a:spcPts val="1200"/>
+              </a:spcAft>
+            </a:pPr>
+            <a:r>
+              <a:rPr lang="en-US" dirty="0"/>
+              <a:t>Scaling: </a:t>
+            </a:r>
+            <a:r>
+              <a:rPr lang="en-US" dirty="0" err="1"/>
+              <a:t>StandardScaler</a:t>
+            </a:r>
+            <a:endParaRPr lang="en-US" dirty="0"/>
+          </a:p>
+          <a:p>
+            <a:pPr marL="285750" indent="-285750">
+              <a:spcAft>
+                <a:spcPts val="1200"/>
+              </a:spcAft>
+            </a:pPr>
+            <a:endParaRPr lang="en-US" dirty="0"/>
+          </a:p>
+          <a:p>
             <a:pPr marL="742950" lvl="1" indent="-285750">
               <a:spcAft>
                 <a:spcPts val="1200"/>
@@ -16452,7 +16573,7 @@
             </a:pPr>
             <a:r>
               <a:rPr lang="en-US" dirty="0"/>
-              <a:t>Split data shapes</a:t>
+              <a:t>Split data shapes:</a:t>
             </a:r>
           </a:p>
           <a:p>
@@ -16527,120 +16648,6 @@
 </file>
 
 <file path=ppt/slides/slide12.xml><?xml version="1.0" encoding="utf-8"?>
-<p:sld xmlns:a="http://schemas.openxmlformats.org/drawingml/2006/main" xmlns:r="http://schemas.openxmlformats.org/officeDocument/2006/relationships" xmlns:p="http://schemas.openxmlformats.org/presentationml/2006/main">
-  <p:cSld>
-    <p:spTree>
-      <p:nvGrpSpPr>
-        <p:cNvPr id="1" name="Shape 300"/>
-        <p:cNvGrpSpPr/>
-        <p:nvPr/>
-      </p:nvGrpSpPr>
-      <p:grpSpPr>
-        <a:xfrm>
-          <a:off x="0" y="0"/>
-          <a:ext cx="0" cy="0"/>
-          <a:chOff x="0" y="0"/>
-          <a:chExt cx="0" cy="0"/>
-        </a:xfrm>
-      </p:grpSpPr>
-      <p:sp>
-        <p:nvSpPr>
-          <p:cNvPr id="301" name="Google Shape;301;p17"/>
-          <p:cNvSpPr txBox="1">
-            <a:spLocks noGrp="1"/>
-          </p:cNvSpPr>
-          <p:nvPr>
-            <p:ph type="title"/>
-          </p:nvPr>
-        </p:nvSpPr>
-        <p:spPr>
-          <a:xfrm>
-            <a:off x="1303800" y="598575"/>
-            <a:ext cx="7030500" cy="999300"/>
-          </a:xfrm>
-          <a:prstGeom prst="rect">
-            <a:avLst/>
-          </a:prstGeom>
-        </p:spPr>
-        <p:txBody>
-          <a:bodyPr spcFirstLastPara="1" wrap="square" lIns="91425" tIns="91425" rIns="91425" bIns="91425" anchor="t" anchorCtr="0">
-            <a:normAutofit/>
-          </a:bodyPr>
-          <a:lstStyle/>
-          <a:p>
-            <a:pPr marL="0" lvl="0" indent="0" algn="l" rtl="0">
-              <a:spcBef>
-                <a:spcPts val="0"/>
-              </a:spcBef>
-              <a:spcAft>
-                <a:spcPts val="0"/>
-              </a:spcAft>
-              <a:buNone/>
-            </a:pPr>
-            <a:r>
-              <a:rPr lang="en"/>
-              <a:t>Data Processing</a:t>
-            </a:r>
-            <a:endParaRPr/>
-          </a:p>
-        </p:txBody>
-      </p:sp>
-      <p:sp>
-        <p:nvSpPr>
-          <p:cNvPr id="302" name="Google Shape;302;p17"/>
-          <p:cNvSpPr txBox="1">
-            <a:spLocks noGrp="1"/>
-          </p:cNvSpPr>
-          <p:nvPr>
-            <p:ph type="body" idx="1"/>
-          </p:nvPr>
-        </p:nvSpPr>
-        <p:spPr>
-          <a:xfrm>
-            <a:off x="1303800" y="1990050"/>
-            <a:ext cx="7030500" cy="2541600"/>
-          </a:xfrm>
-          <a:prstGeom prst="rect">
-            <a:avLst/>
-          </a:prstGeom>
-        </p:spPr>
-        <p:txBody>
-          <a:bodyPr spcFirstLastPara="1" wrap="square" lIns="91425" tIns="91425" rIns="91425" bIns="91425" anchor="t" anchorCtr="0">
-            <a:normAutofit/>
-          </a:bodyPr>
-          <a:lstStyle/>
-          <a:p>
-            <a:pPr marL="285750" indent="-285750">
-              <a:spcAft>
-                <a:spcPts val="1200"/>
-              </a:spcAft>
-            </a:pPr>
-            <a:r>
-              <a:rPr lang="en-US" dirty="0"/>
-              <a:t>Scaling: </a:t>
-            </a:r>
-            <a:r>
-              <a:rPr lang="en-US" dirty="0" err="1"/>
-              <a:t>StandardScaler</a:t>
-            </a:r>
-            <a:endParaRPr lang="en-US" dirty="0"/>
-          </a:p>
-        </p:txBody>
-      </p:sp>
-    </p:spTree>
-    <p:extLst>
-      <p:ext uri="{BB962C8B-B14F-4D97-AF65-F5344CB8AC3E}">
-        <p14:creationId xmlns:p14="http://schemas.microsoft.com/office/powerpoint/2010/main" val="2983333963"/>
-      </p:ext>
-    </p:extLst>
-  </p:cSld>
-  <p:clrMapOvr>
-    <a:masterClrMapping/>
-  </p:clrMapOvr>
-</p:sld>
-</file>
-
-<file path=ppt/slides/slide13.xml><?xml version="1.0" encoding="utf-8"?>
 <p:sld xmlns:a="http://schemas.openxmlformats.org/drawingml/2006/main" xmlns:r="http://schemas.openxmlformats.org/officeDocument/2006/relationships" xmlns:p="http://schemas.openxmlformats.org/presentationml/2006/main">
   <p:cSld>
     <p:spTree>
@@ -17136,7 +17143,7 @@
 </p:sld>
 </file>
 
-<file path=ppt/slides/slide14.xml><?xml version="1.0" encoding="utf-8"?>
+<file path=ppt/slides/slide13.xml><?xml version="1.0" encoding="utf-8"?>
 <p:sld xmlns:a="http://schemas.openxmlformats.org/drawingml/2006/main" xmlns:r="http://schemas.openxmlformats.org/officeDocument/2006/relationships" xmlns:p="http://schemas.openxmlformats.org/presentationml/2006/main">
   <p:cSld>
     <p:spTree>
@@ -17454,112 +17461,7 @@
 </p:sld>
 </file>
 
-<file path=ppt/slides/slide15.xml><?xml version="1.0" encoding="utf-8"?>
-<p:sld xmlns:a="http://schemas.openxmlformats.org/drawingml/2006/main" xmlns:r="http://schemas.openxmlformats.org/officeDocument/2006/relationships" xmlns:p="http://schemas.openxmlformats.org/presentationml/2006/main">
-  <p:cSld>
-    <p:spTree>
-      <p:nvGrpSpPr>
-        <p:cNvPr id="1" name="Shape 312"/>
-        <p:cNvGrpSpPr/>
-        <p:nvPr/>
-      </p:nvGrpSpPr>
-      <p:grpSpPr>
-        <a:xfrm>
-          <a:off x="0" y="0"/>
-          <a:ext cx="0" cy="0"/>
-          <a:chOff x="0" y="0"/>
-          <a:chExt cx="0" cy="0"/>
-        </a:xfrm>
-      </p:grpSpPr>
-      <p:sp>
-        <p:nvSpPr>
-          <p:cNvPr id="313" name="Google Shape;313;p19"/>
-          <p:cNvSpPr txBox="1">
-            <a:spLocks noGrp="1"/>
-          </p:cNvSpPr>
-          <p:nvPr>
-            <p:ph type="title"/>
-          </p:nvPr>
-        </p:nvSpPr>
-        <p:spPr>
-          <a:xfrm>
-            <a:off x="1303800" y="598575"/>
-            <a:ext cx="7030500" cy="999300"/>
-          </a:xfrm>
-          <a:prstGeom prst="rect">
-            <a:avLst/>
-          </a:prstGeom>
-        </p:spPr>
-        <p:txBody>
-          <a:bodyPr spcFirstLastPara="1" wrap="square" lIns="91425" tIns="91425" rIns="91425" bIns="91425" anchor="t" anchorCtr="0">
-            <a:normAutofit/>
-          </a:bodyPr>
-          <a:lstStyle/>
-          <a:p>
-            <a:pPr marL="0" lvl="0" indent="0" algn="l" rtl="0">
-              <a:spcBef>
-                <a:spcPts val="0"/>
-              </a:spcBef>
-              <a:spcAft>
-                <a:spcPts val="0"/>
-              </a:spcAft>
-              <a:buNone/>
-            </a:pPr>
-            <a:r>
-              <a:rPr lang="en"/>
-              <a:t>Machine Learning Limitations</a:t>
-            </a:r>
-            <a:endParaRPr/>
-          </a:p>
-        </p:txBody>
-      </p:sp>
-      <p:sp>
-        <p:nvSpPr>
-          <p:cNvPr id="314" name="Google Shape;314;p19"/>
-          <p:cNvSpPr txBox="1">
-            <a:spLocks noGrp="1"/>
-          </p:cNvSpPr>
-          <p:nvPr>
-            <p:ph type="body" idx="1"/>
-          </p:nvPr>
-        </p:nvSpPr>
-        <p:spPr>
-          <a:xfrm>
-            <a:off x="1303800" y="1990050"/>
-            <a:ext cx="7030500" cy="2541600"/>
-          </a:xfrm>
-          <a:prstGeom prst="rect">
-            <a:avLst/>
-          </a:prstGeom>
-        </p:spPr>
-        <p:txBody>
-          <a:bodyPr spcFirstLastPara="1" wrap="square" lIns="91425" tIns="91425" rIns="91425" bIns="91425" anchor="t" anchorCtr="0">
-            <a:normAutofit/>
-          </a:bodyPr>
-          <a:lstStyle/>
-          <a:p>
-            <a:pPr marL="0" lvl="0" indent="0" algn="l" rtl="0">
-              <a:spcBef>
-                <a:spcPts val="0"/>
-              </a:spcBef>
-              <a:spcAft>
-                <a:spcPts val="1200"/>
-              </a:spcAft>
-              <a:buNone/>
-            </a:pPr>
-            <a:endParaRPr dirty="0"/>
-          </a:p>
-        </p:txBody>
-      </p:sp>
-    </p:spTree>
-  </p:cSld>
-  <p:clrMapOvr>
-    <a:masterClrMapping/>
-  </p:clrMapOvr>
-</p:sld>
-</file>
-
-<file path=ppt/slides/slide16.xml><?xml version="1.0" encoding="utf-8"?>
+<file path=ppt/slides/slide14.xml><?xml version="1.0" encoding="utf-8"?>
 <p:sld xmlns:a="http://schemas.openxmlformats.org/drawingml/2006/main" xmlns:r="http://schemas.openxmlformats.org/officeDocument/2006/relationships" xmlns:p="http://schemas.openxmlformats.org/presentationml/2006/main">
   <p:cSld>
     <p:spTree>
@@ -17653,9 +17555,23 @@
               <a:buNone/>
             </a:pPr>
             <a:r>
-              <a:rPr lang="en-US" dirty="0"/>
+              <a:rPr lang="en-US" dirty="0">
+                <a:hlinkClick r:id="rId3"/>
+              </a:rPr>
               <a:t>https://github.com/lykkelig/Group6_Final_Project/tree/Erik_branch/Web</a:t>
             </a:r>
+            <a:endParaRPr lang="en-US" dirty="0"/>
+          </a:p>
+          <a:p>
+            <a:pPr marL="0" lvl="0" indent="0" algn="l" rtl="0">
+              <a:spcBef>
+                <a:spcPts val="0"/>
+              </a:spcBef>
+              <a:spcAft>
+                <a:spcPts val="1200"/>
+              </a:spcAft>
+              <a:buNone/>
+            </a:pPr>
             <a:endParaRPr dirty="0"/>
           </a:p>
         </p:txBody>
@@ -17668,7 +17584,7 @@
 </p:sld>
 </file>
 
-<file path=ppt/slides/slide17.xml><?xml version="1.0" encoding="utf-8"?>
+<file path=ppt/slides/slide15.xml><?xml version="1.0" encoding="utf-8"?>
 <p:sld xmlns:a="http://schemas.openxmlformats.org/drawingml/2006/main" xmlns:r="http://schemas.openxmlformats.org/officeDocument/2006/relationships" xmlns:p="http://schemas.openxmlformats.org/presentationml/2006/main">
   <p:cSld>
     <p:spTree>
@@ -17762,9 +17678,23 @@
               <a:buNone/>
             </a:pPr>
             <a:r>
-              <a:rPr lang="en-US" dirty="0"/>
+              <a:rPr lang="en-US" dirty="0">
+                <a:hlinkClick r:id="rId3"/>
+              </a:rPr>
               <a:t>https://public.tableau.com/app/profile/erik.svoboda/viz/EmployeeAttrition_16528352408970/FinalProject?publish=yes</a:t>
             </a:r>
+            <a:endParaRPr lang="en-US" dirty="0"/>
+          </a:p>
+          <a:p>
+            <a:pPr marL="0" lvl="0" indent="0" algn="l" rtl="0">
+              <a:spcBef>
+                <a:spcPts val="0"/>
+              </a:spcBef>
+              <a:spcAft>
+                <a:spcPts val="1200"/>
+              </a:spcAft>
+              <a:buNone/>
+            </a:pPr>
             <a:endParaRPr dirty="0"/>
           </a:p>
         </p:txBody>
@@ -18634,7 +18564,7 @@
         <p:spPr>
           <a:xfrm>
             <a:off x="1303800" y="1990050"/>
-            <a:ext cx="2589774" cy="2541600"/>
+            <a:ext cx="2168047" cy="2541600"/>
           </a:xfrm>
           <a:prstGeom prst="rect">
             <a:avLst/>
@@ -18665,10 +18595,10 @@
       </p:sp>
       <p:pic>
         <p:nvPicPr>
-          <p:cNvPr id="4" name="Picture 3" descr="Chart&#10;&#10;Description automatically generated">
+          <p:cNvPr id="2" name="Picture 1">
             <a:extLst>
               <a:ext uri="{FF2B5EF4-FFF2-40B4-BE49-F238E27FC236}">
-                <a16:creationId xmlns:a16="http://schemas.microsoft.com/office/drawing/2014/main" id="{DB626B06-0C57-402F-AC2C-7D2B938BF0FF}"/>
+                <a16:creationId xmlns:a16="http://schemas.microsoft.com/office/drawing/2014/main" id="{8DD345FC-E5E8-426C-B124-C5B14D9AD4D2}"/>
               </a:ext>
             </a:extLst>
           </p:cNvPr>
@@ -18677,16 +18607,15 @@
           </p:cNvPicPr>
           <p:nvPr/>
         </p:nvPicPr>
-        <p:blipFill>
+        <p:blipFill rotWithShape="1">
           <a:blip r:embed="rId3"/>
-          <a:stretch>
-            <a:fillRect/>
-          </a:stretch>
+          <a:srcRect r="10364"/>
+          <a:stretch/>
         </p:blipFill>
         <p:spPr>
           <a:xfrm>
-            <a:off x="3767150" y="446731"/>
-            <a:ext cx="5371354" cy="4250042"/>
+            <a:off x="3275904" y="0"/>
+            <a:ext cx="5796844" cy="5143500"/>
           </a:xfrm>
           <a:prstGeom prst="rect">
             <a:avLst/>

</xml_diff>